<commit_message>
praparing for the release
</commit_message>
<xml_diff>
--- a/2025_SMDM/04_simple_DES.pptx
+++ b/2025_SMDM/04_simple_DES.pptx
@@ -212,7 +212,7 @@
           <a:p>
             <a:fld id="{E033252C-ECEF-0044-BF19-FBFB46CE84A2}" type="datetimeFigureOut">
               <a:rPr lang="en-US" smtClean="0"/>
-              <a:t>6/12/25</a:t>
+              <a:t>6/14/25</a:t>
             </a:fld>
             <a:endParaRPr lang="en-US"/>
           </a:p>
@@ -626,7 +626,7 @@
           <a:p>
             <a:fld id="{6A8FB48A-BFC4-2846-8228-6201ABA4D0C5}" type="datetimeFigureOut">
               <a:rPr lang="en-US" smtClean="0"/>
-              <a:t>6/12/25</a:t>
+              <a:t>6/14/25</a:t>
             </a:fld>
             <a:endParaRPr lang="en-US"/>
           </a:p>
@@ -824,7 +824,7 @@
           <a:p>
             <a:fld id="{6A8FB48A-BFC4-2846-8228-6201ABA4D0C5}" type="datetimeFigureOut">
               <a:rPr lang="en-US" smtClean="0"/>
-              <a:t>6/12/25</a:t>
+              <a:t>6/14/25</a:t>
             </a:fld>
             <a:endParaRPr lang="en-US"/>
           </a:p>
@@ -1032,7 +1032,7 @@
           <a:p>
             <a:fld id="{6A8FB48A-BFC4-2846-8228-6201ABA4D0C5}" type="datetimeFigureOut">
               <a:rPr lang="en-US" smtClean="0"/>
-              <a:t>6/12/25</a:t>
+              <a:t>6/14/25</a:t>
             </a:fld>
             <a:endParaRPr lang="en-US"/>
           </a:p>
@@ -1230,7 +1230,7 @@
           <a:p>
             <a:fld id="{6A8FB48A-BFC4-2846-8228-6201ABA4D0C5}" type="datetimeFigureOut">
               <a:rPr lang="en-US" smtClean="0"/>
-              <a:t>6/12/25</a:t>
+              <a:t>6/14/25</a:t>
             </a:fld>
             <a:endParaRPr lang="en-US"/>
           </a:p>
@@ -1505,7 +1505,7 @@
           <a:p>
             <a:fld id="{6A8FB48A-BFC4-2846-8228-6201ABA4D0C5}" type="datetimeFigureOut">
               <a:rPr lang="en-US" smtClean="0"/>
-              <a:t>6/12/25</a:t>
+              <a:t>6/14/25</a:t>
             </a:fld>
             <a:endParaRPr lang="en-US"/>
           </a:p>
@@ -1770,7 +1770,7 @@
           <a:p>
             <a:fld id="{6A8FB48A-BFC4-2846-8228-6201ABA4D0C5}" type="datetimeFigureOut">
               <a:rPr lang="en-US" smtClean="0"/>
-              <a:t>6/12/25</a:t>
+              <a:t>6/14/25</a:t>
             </a:fld>
             <a:endParaRPr lang="en-US"/>
           </a:p>
@@ -2182,7 +2182,7 @@
           <a:p>
             <a:fld id="{6A8FB48A-BFC4-2846-8228-6201ABA4D0C5}" type="datetimeFigureOut">
               <a:rPr lang="en-US" smtClean="0"/>
-              <a:t>6/12/25</a:t>
+              <a:t>6/14/25</a:t>
             </a:fld>
             <a:endParaRPr lang="en-US"/>
           </a:p>
@@ -2323,7 +2323,7 @@
           <a:p>
             <a:fld id="{6A8FB48A-BFC4-2846-8228-6201ABA4D0C5}" type="datetimeFigureOut">
               <a:rPr lang="en-US" smtClean="0"/>
-              <a:t>6/12/25</a:t>
+              <a:t>6/14/25</a:t>
             </a:fld>
             <a:endParaRPr lang="en-US"/>
           </a:p>
@@ -2436,7 +2436,7 @@
           <a:p>
             <a:fld id="{6A8FB48A-BFC4-2846-8228-6201ABA4D0C5}" type="datetimeFigureOut">
               <a:rPr lang="en-US" smtClean="0"/>
-              <a:t>6/12/25</a:t>
+              <a:t>6/14/25</a:t>
             </a:fld>
             <a:endParaRPr lang="en-US"/>
           </a:p>
@@ -2747,7 +2747,7 @@
           <a:p>
             <a:fld id="{6A8FB48A-BFC4-2846-8228-6201ABA4D0C5}" type="datetimeFigureOut">
               <a:rPr lang="en-US" smtClean="0"/>
-              <a:t>6/12/25</a:t>
+              <a:t>6/14/25</a:t>
             </a:fld>
             <a:endParaRPr lang="en-US"/>
           </a:p>
@@ -3035,7 +3035,7 @@
           <a:p>
             <a:fld id="{6A8FB48A-BFC4-2846-8228-6201ABA4D0C5}" type="datetimeFigureOut">
               <a:rPr lang="en-US" smtClean="0"/>
-              <a:t>6/12/25</a:t>
+              <a:t>6/14/25</a:t>
             </a:fld>
             <a:endParaRPr lang="en-US"/>
           </a:p>
@@ -3276,7 +3276,7 @@
           <a:p>
             <a:fld id="{6A8FB48A-BFC4-2846-8228-6201ABA4D0C5}" type="datetimeFigureOut">
               <a:rPr lang="en-US" smtClean="0"/>
-              <a:t>6/12/25</a:t>
+              <a:t>6/14/25</a:t>
             </a:fld>
             <a:endParaRPr lang="en-US"/>
           </a:p>
@@ -6151,6 +6151,15 @@
 </file>
 
 <file path=customXml/item1.xml><?xml version="1.0" encoding="utf-8"?>
+<?mso-contentType ?>
+<FormTemplates xmlns="http://schemas.microsoft.com/sharepoint/v3/contenttype/forms">
+  <Display>DocumentLibraryForm</Display>
+  <Edit>DocumentLibraryForm</Edit>
+  <New>DocumentLibraryForm</New>
+</FormTemplates>
+</file>
+
+<file path=customXml/item2.xml><?xml version="1.0" encoding="utf-8"?>
 <p:properties xmlns:p="http://schemas.microsoft.com/office/2006/metadata/properties" xmlns:xsi="http://www.w3.org/2001/XMLSchema-instance" xmlns:pc="http://schemas.microsoft.com/office/infopath/2007/PartnerControls">
   <documentManagement>
     <TaxCatchAll xmlns="b6c9d19c-b34a-4cf4-8ebf-64c63fc48083" xsi:nil="true"/>
@@ -6159,15 +6168,6 @@
     </lcf76f155ced4ddcb4097134ff3c332f>
   </documentManagement>
 </p:properties>
-</file>
-
-<file path=customXml/item2.xml><?xml version="1.0" encoding="utf-8"?>
-<?mso-contentType ?>
-<FormTemplates xmlns="http://schemas.microsoft.com/sharepoint/v3/contenttype/forms">
-  <Display>DocumentLibraryForm</Display>
-  <Edit>DocumentLibraryForm</Edit>
-  <New>DocumentLibraryForm</New>
-</FormTemplates>
 </file>
 
 <file path=customXml/item3.xml><?xml version="1.0" encoding="utf-8"?>
@@ -6411,6 +6411,14 @@
 </file>
 
 <file path=customXml/itemProps1.xml><?xml version="1.0" encoding="utf-8"?>
+<ds:datastoreItem xmlns:ds="http://schemas.openxmlformats.org/officeDocument/2006/customXml" ds:itemID="{EF0BFC65-ABD5-40EA-BAE0-821B9D6524E8}">
+  <ds:schemaRefs>
+    <ds:schemaRef ds:uri="http://schemas.microsoft.com/sharepoint/v3/contenttype/forms"/>
+  </ds:schemaRefs>
+</ds:datastoreItem>
+</file>
+
+<file path=customXml/itemProps2.xml><?xml version="1.0" encoding="utf-8"?>
 <ds:datastoreItem xmlns:ds="http://schemas.openxmlformats.org/officeDocument/2006/customXml" ds:itemID="{E709C047-1DE0-4980-A90A-4D5EFC165D2C}">
   <ds:schemaRefs>
     <ds:schemaRef ds:uri="0efde304-9646-43d8-8eee-5b1a55ab17f1"/>
@@ -6424,14 +6432,6 @@
     <ds:schemaRef ds:uri="http://schemas.microsoft.com/office/infopath/2007/PartnerControls"/>
     <ds:schemaRef ds:uri="http://schemas.openxmlformats.org/package/2006/metadata/core-properties"/>
     <ds:schemaRef ds:uri="http://www.w3.org/XML/1998/namespace"/>
-  </ds:schemaRefs>
-</ds:datastoreItem>
-</file>
-
-<file path=customXml/itemProps2.xml><?xml version="1.0" encoding="utf-8"?>
-<ds:datastoreItem xmlns:ds="http://schemas.openxmlformats.org/officeDocument/2006/customXml" ds:itemID="{EF0BFC65-ABD5-40EA-BAE0-821B9D6524E8}">
-  <ds:schemaRefs>
-    <ds:schemaRef ds:uri="http://schemas.microsoft.com/sharepoint/v3/contenttype/forms"/>
   </ds:schemaRefs>
 </ds:datastoreItem>
 </file>

</xml_diff>